<commit_message>
final commit on task 1
</commit_message>
<xml_diff>
--- a/Presentation Template - Task 1.pptx
+++ b/Presentation Template - Task 1.pptx
@@ -262,7 +262,7 @@
           <a:p>
             <a:fld id="{6670FE10-F406-47AF-8AE1-E9BA4C7E25F2}" type="datetimeFigureOut">
               <a:rPr lang="en-GB" smtClean="0"/>
-              <a:t>06/12/2022</a:t>
+              <a:t>02/05/2023</a:t>
             </a:fld>
             <a:endParaRPr lang="en-GB" dirty="0"/>
           </a:p>
@@ -596,7 +596,7 @@
           <a:p>
             <a:fld id="{6670FE10-F406-47AF-8AE1-E9BA4C7E25F2}" type="datetimeFigureOut">
               <a:rPr lang="en-GB" smtClean="0"/>
-              <a:t>06/12/2022</a:t>
+              <a:t>02/05/2023</a:t>
             </a:fld>
             <a:endParaRPr lang="en-GB"/>
           </a:p>
@@ -806,7 +806,7 @@
           <a:p>
             <a:fld id="{6670FE10-F406-47AF-8AE1-E9BA4C7E25F2}" type="datetimeFigureOut">
               <a:rPr lang="en-GB" smtClean="0"/>
-              <a:t>06/12/2022</a:t>
+              <a:t>02/05/2023</a:t>
             </a:fld>
             <a:endParaRPr lang="en-GB"/>
           </a:p>
@@ -1006,7 +1006,7 @@
           <a:p>
             <a:fld id="{6670FE10-F406-47AF-8AE1-E9BA4C7E25F2}" type="datetimeFigureOut">
               <a:rPr lang="en-GB" smtClean="0"/>
-              <a:t>06/12/2022</a:t>
+              <a:t>02/05/2023</a:t>
             </a:fld>
             <a:endParaRPr lang="en-GB"/>
           </a:p>
@@ -1413,7 +1413,7 @@
           <a:p>
             <a:fld id="{6670FE10-F406-47AF-8AE1-E9BA4C7E25F2}" type="datetimeFigureOut">
               <a:rPr lang="en-GB" smtClean="0"/>
-              <a:t>06/12/2022</a:t>
+              <a:t>02/05/2023</a:t>
             </a:fld>
             <a:endParaRPr lang="en-GB"/>
           </a:p>
@@ -1681,7 +1681,7 @@
           <a:p>
             <a:fld id="{6670FE10-F406-47AF-8AE1-E9BA4C7E25F2}" type="datetimeFigureOut">
               <a:rPr lang="en-GB" smtClean="0"/>
-              <a:t>06/12/2022</a:t>
+              <a:t>02/05/2023</a:t>
             </a:fld>
             <a:endParaRPr lang="en-GB"/>
           </a:p>
@@ -2096,7 +2096,7 @@
           <a:p>
             <a:fld id="{6670FE10-F406-47AF-8AE1-E9BA4C7E25F2}" type="datetimeFigureOut">
               <a:rPr lang="en-GB" smtClean="0"/>
-              <a:t>06/12/2022</a:t>
+              <a:t>02/05/2023</a:t>
             </a:fld>
             <a:endParaRPr lang="en-GB"/>
           </a:p>
@@ -2238,7 +2238,7 @@
           <a:p>
             <a:fld id="{6670FE10-F406-47AF-8AE1-E9BA4C7E25F2}" type="datetimeFigureOut">
               <a:rPr lang="en-GB" smtClean="0"/>
-              <a:t>06/12/2022</a:t>
+              <a:t>02/05/2023</a:t>
             </a:fld>
             <a:endParaRPr lang="en-GB"/>
           </a:p>
@@ -2351,7 +2351,7 @@
           <a:p>
             <a:fld id="{6670FE10-F406-47AF-8AE1-E9BA4C7E25F2}" type="datetimeFigureOut">
               <a:rPr lang="en-GB" smtClean="0"/>
-              <a:t>06/12/2022</a:t>
+              <a:t>02/05/2023</a:t>
             </a:fld>
             <a:endParaRPr lang="en-GB"/>
           </a:p>
@@ -2664,7 +2664,7 @@
           <a:p>
             <a:fld id="{6670FE10-F406-47AF-8AE1-E9BA4C7E25F2}" type="datetimeFigureOut">
               <a:rPr lang="en-GB" smtClean="0"/>
-              <a:t>06/12/2022</a:t>
+              <a:t>02/05/2023</a:t>
             </a:fld>
             <a:endParaRPr lang="en-GB"/>
           </a:p>
@@ -2953,7 +2953,7 @@
           <a:p>
             <a:fld id="{6670FE10-F406-47AF-8AE1-E9BA4C7E25F2}" type="datetimeFigureOut">
               <a:rPr lang="en-GB" smtClean="0"/>
-              <a:t>06/12/2022</a:t>
+              <a:t>02/05/2023</a:t>
             </a:fld>
             <a:endParaRPr lang="en-GB"/>
           </a:p>
@@ -3196,7 +3196,7 @@
           <a:p>
             <a:fld id="{6670FE10-F406-47AF-8AE1-E9BA4C7E25F2}" type="datetimeFigureOut">
               <a:rPr lang="en-GB" smtClean="0"/>
-              <a:t>06/12/2022</a:t>
+              <a:t>02/05/2023</a:t>
             </a:fld>
             <a:endParaRPr lang="en-GB"/>
           </a:p>
@@ -3636,7 +3636,7 @@
           <a:p>
             <a:r>
               <a:rPr lang="en-GB" dirty="0"/>
-              <a:t>TITLE</a:t>
+              <a:t>INSIGHTS FROM REVIEWS</a:t>
             </a:r>
           </a:p>
         </p:txBody>
@@ -3662,7 +3662,22 @@
           <a:bodyPr/>
           <a:lstStyle/>
           <a:p>
-            <a:endParaRPr lang="en-GB" dirty="0"/>
+            <a:r>
+              <a:rPr lang="en-GB" dirty="0"/>
+              <a:t>BRITISH AIRWAYS</a:t>
+            </a:r>
+          </a:p>
+          <a:p>
+            <a:r>
+              <a:rPr lang="en-GB" sz="1200" dirty="0">
+                <a:solidFill>
+                  <a:schemeClr val="bg2">
+                    <a:lumMod val="50000"/>
+                  </a:schemeClr>
+                </a:solidFill>
+              </a:rPr>
+              <a:t>PRESENTATION BY EMMANUEL DE-GRAFT</a:t>
+            </a:r>
           </a:p>
         </p:txBody>
       </p:sp>
@@ -3698,51 +3713,368 @@
       </p:grpSpPr>
       <p:sp>
         <p:nvSpPr>
-          <p:cNvPr id="2" name="Title 1">
-            <a:extLst>
-              <a:ext uri="{FF2B5EF4-FFF2-40B4-BE49-F238E27FC236}">
-                <a16:creationId xmlns:a16="http://schemas.microsoft.com/office/drawing/2014/main" id="{7BDADD12-D653-7463-3EAD-70846DE1F2CC}"/>
-              </a:ext>
-            </a:extLst>
-          </p:cNvPr>
-          <p:cNvSpPr>
-            <a:spLocks noGrp="1"/>
-          </p:cNvSpPr>
-          <p:nvPr>
-            <p:ph type="title"/>
-          </p:nvPr>
-        </p:nvSpPr>
-        <p:spPr/>
-        <p:txBody>
-          <a:bodyPr/>
-          <a:lstStyle/>
-          <a:p>
-            <a:endParaRPr lang="en-GB"/>
-          </a:p>
-        </p:txBody>
-      </p:sp>
-      <p:sp>
-        <p:nvSpPr>
-          <p:cNvPr id="3" name="Content Placeholder 2">
-            <a:extLst>
-              <a:ext uri="{FF2B5EF4-FFF2-40B4-BE49-F238E27FC236}">
-                <a16:creationId xmlns:a16="http://schemas.microsoft.com/office/drawing/2014/main" id="{4B7DE7AA-9B0B-5A8C-C9D3-A89360AA97ED}"/>
-              </a:ext>
-            </a:extLst>
-          </p:cNvPr>
-          <p:cNvSpPr>
-            <a:spLocks noGrp="1"/>
-          </p:cNvSpPr>
-          <p:nvPr>
-            <p:ph idx="1"/>
-          </p:nvPr>
-        </p:nvSpPr>
-        <p:spPr/>
-        <p:txBody>
-          <a:bodyPr/>
-          <a:lstStyle/>
-          <a:p>
-            <a:endParaRPr lang="en-GB"/>
+          <p:cNvPr id="8" name="TextBox 7">
+            <a:extLst>
+              <a:ext uri="{FF2B5EF4-FFF2-40B4-BE49-F238E27FC236}">
+                <a16:creationId xmlns:a16="http://schemas.microsoft.com/office/drawing/2014/main" id="{A504C01F-8020-D98B-641E-592908C63F0C}"/>
+              </a:ext>
+            </a:extLst>
+          </p:cNvPr>
+          <p:cNvSpPr txBox="1"/>
+          <p:nvPr/>
+        </p:nvSpPr>
+        <p:spPr>
+          <a:xfrm>
+            <a:off x="1539375" y="466408"/>
+            <a:ext cx="9555061" cy="369332"/>
+          </a:xfrm>
+          <a:prstGeom prst="rect">
+            <a:avLst/>
+          </a:prstGeom>
+          <a:noFill/>
+        </p:spPr>
+        <p:txBody>
+          <a:bodyPr wrap="square" rtlCol="0">
+            <a:spAutoFit/>
+          </a:bodyPr>
+          <a:lstStyle/>
+          <a:p>
+            <a:pPr algn="ctr"/>
+            <a:r>
+              <a:rPr lang="en-US" dirty="0"/>
+              <a:t>Insights from British Airways reviews: Sentiment Analysis and Topic Modelling</a:t>
+            </a:r>
+            <a:endParaRPr lang="en-GH" dirty="0"/>
+          </a:p>
+        </p:txBody>
+      </p:sp>
+      <p:sp>
+        <p:nvSpPr>
+          <p:cNvPr id="9" name="TextBox 8">
+            <a:extLst>
+              <a:ext uri="{FF2B5EF4-FFF2-40B4-BE49-F238E27FC236}">
+                <a16:creationId xmlns:a16="http://schemas.microsoft.com/office/drawing/2014/main" id="{71E488AC-6232-89AB-0BD7-30034F041ADA}"/>
+              </a:ext>
+            </a:extLst>
+          </p:cNvPr>
+          <p:cNvSpPr txBox="1"/>
+          <p:nvPr/>
+        </p:nvSpPr>
+        <p:spPr>
+          <a:xfrm>
+            <a:off x="846787" y="5351018"/>
+            <a:ext cx="4993728" cy="923330"/>
+          </a:xfrm>
+          <a:prstGeom prst="rect">
+            <a:avLst/>
+          </a:prstGeom>
+          <a:noFill/>
+        </p:spPr>
+        <p:txBody>
+          <a:bodyPr wrap="square" rtlCol="0">
+            <a:spAutoFit/>
+          </a:bodyPr>
+          <a:lstStyle/>
+          <a:p>
+            <a:r>
+              <a:rPr lang="en-US" dirty="0"/>
+              <a:t>Out of 3476 reviews, 2492 were positive, 968 were negative and 16 were neutral. Thus most of the reviews were segregated into positive </a:t>
+            </a:r>
+            <a:r>
+              <a:rPr lang="en-US"/>
+              <a:t>and negative.</a:t>
+            </a:r>
+            <a:endParaRPr lang="en-GH" dirty="0"/>
+          </a:p>
+        </p:txBody>
+      </p:sp>
+      <p:pic>
+        <p:nvPicPr>
+          <p:cNvPr id="6" name="Picture 5">
+            <a:extLst>
+              <a:ext uri="{FF2B5EF4-FFF2-40B4-BE49-F238E27FC236}">
+                <a16:creationId xmlns:a16="http://schemas.microsoft.com/office/drawing/2014/main" id="{FF7D8512-FE8D-C67A-A659-0224B0B109BA}"/>
+              </a:ext>
+            </a:extLst>
+          </p:cNvPr>
+          <p:cNvPicPr>
+            <a:picLocks noChangeAspect="1"/>
+          </p:cNvPicPr>
+          <p:nvPr/>
+        </p:nvPicPr>
+        <p:blipFill>
+          <a:blip r:embed="rId2">
+            <a:extLst>
+              <a:ext uri="{28A0092B-C50C-407E-A947-70E740481C1C}">
+                <a14:useLocalDpi xmlns:a14="http://schemas.microsoft.com/office/drawing/2010/main" val="0"/>
+              </a:ext>
+            </a:extLst>
+          </a:blip>
+          <a:stretch>
+            <a:fillRect/>
+          </a:stretch>
+        </p:blipFill>
+        <p:spPr>
+          <a:xfrm>
+            <a:off x="6031670" y="903932"/>
+            <a:ext cx="5953417" cy="4590777"/>
+          </a:xfrm>
+          <a:prstGeom prst="rect">
+            <a:avLst/>
+          </a:prstGeom>
+        </p:spPr>
+      </p:pic>
+      <p:sp>
+        <p:nvSpPr>
+          <p:cNvPr id="10" name="TextBox 9">
+            <a:extLst>
+              <a:ext uri="{FF2B5EF4-FFF2-40B4-BE49-F238E27FC236}">
+                <a16:creationId xmlns:a16="http://schemas.microsoft.com/office/drawing/2014/main" id="{B1B87292-1AFA-0C7E-FE21-6ED37F9723B8}"/>
+              </a:ext>
+            </a:extLst>
+          </p:cNvPr>
+          <p:cNvSpPr txBox="1"/>
+          <p:nvPr/>
+        </p:nvSpPr>
+        <p:spPr>
+          <a:xfrm>
+            <a:off x="6316906" y="5351018"/>
+            <a:ext cx="5382943" cy="1200329"/>
+          </a:xfrm>
+          <a:prstGeom prst="rect">
+            <a:avLst/>
+          </a:prstGeom>
+          <a:noFill/>
+        </p:spPr>
+        <p:txBody>
+          <a:bodyPr wrap="square" rtlCol="0">
+            <a:spAutoFit/>
+          </a:bodyPr>
+          <a:lstStyle/>
+          <a:p>
+            <a:r>
+              <a:rPr lang="en-US" dirty="0"/>
+              <a:t>The chart above depicts the frequency of topics in the reviews which include but not limited to “flight”, “service”, ”food”, ”seat”. Customers talked about the inflight service, especially food.</a:t>
+            </a:r>
+            <a:endParaRPr lang="en-GH" dirty="0"/>
+          </a:p>
+        </p:txBody>
+      </p:sp>
+      <p:sp>
+        <p:nvSpPr>
+          <p:cNvPr id="21" name="TextBox 20">
+            <a:extLst>
+              <a:ext uri="{FF2B5EF4-FFF2-40B4-BE49-F238E27FC236}">
+                <a16:creationId xmlns:a16="http://schemas.microsoft.com/office/drawing/2014/main" id="{4520CA10-60A5-9621-3194-70B4517AD7E3}"/>
+              </a:ext>
+            </a:extLst>
+          </p:cNvPr>
+          <p:cNvSpPr txBox="1"/>
+          <p:nvPr/>
+        </p:nvSpPr>
+        <p:spPr>
+          <a:xfrm>
+            <a:off x="6409709" y="906817"/>
+            <a:ext cx="4723002" cy="369332"/>
+          </a:xfrm>
+          <a:prstGeom prst="rect">
+            <a:avLst/>
+          </a:prstGeom>
+          <a:noFill/>
+        </p:spPr>
+        <p:txBody>
+          <a:bodyPr wrap="square" rtlCol="0">
+            <a:spAutoFit/>
+          </a:bodyPr>
+          <a:lstStyle/>
+          <a:p>
+            <a:pPr algn="ctr"/>
+            <a:r>
+              <a:rPr lang="en-US" dirty="0"/>
+              <a:t>Topic Modelling</a:t>
+            </a:r>
+            <a:endParaRPr lang="en-GH" dirty="0"/>
+          </a:p>
+        </p:txBody>
+      </p:sp>
+      <p:pic>
+        <p:nvPicPr>
+          <p:cNvPr id="24" name="Picture 23">
+            <a:extLst>
+              <a:ext uri="{FF2B5EF4-FFF2-40B4-BE49-F238E27FC236}">
+                <a16:creationId xmlns:a16="http://schemas.microsoft.com/office/drawing/2014/main" id="{61577383-2D62-3927-DB2E-E61BA6785160}"/>
+              </a:ext>
+            </a:extLst>
+          </p:cNvPr>
+          <p:cNvPicPr>
+            <a:picLocks noChangeAspect="1"/>
+          </p:cNvPicPr>
+          <p:nvPr/>
+        </p:nvPicPr>
+        <p:blipFill>
+          <a:blip r:embed="rId3">
+            <a:extLst>
+              <a:ext uri="{28A0092B-C50C-407E-A947-70E740481C1C}">
+                <a14:useLocalDpi xmlns:a14="http://schemas.microsoft.com/office/drawing/2010/main" val="0"/>
+              </a:ext>
+            </a:extLst>
+          </a:blip>
+          <a:stretch>
+            <a:fillRect/>
+          </a:stretch>
+        </p:blipFill>
+        <p:spPr>
+          <a:xfrm>
+            <a:off x="68217" y="1136104"/>
+            <a:ext cx="5268045" cy="3951034"/>
+          </a:xfrm>
+          <a:prstGeom prst="rect">
+            <a:avLst/>
+          </a:prstGeom>
+        </p:spPr>
+      </p:pic>
+      <p:sp>
+        <p:nvSpPr>
+          <p:cNvPr id="20" name="TextBox 19">
+            <a:extLst>
+              <a:ext uri="{FF2B5EF4-FFF2-40B4-BE49-F238E27FC236}">
+                <a16:creationId xmlns:a16="http://schemas.microsoft.com/office/drawing/2014/main" id="{7A04AB24-A23E-8096-12DE-99E198412F7D}"/>
+              </a:ext>
+            </a:extLst>
+          </p:cNvPr>
+          <p:cNvSpPr txBox="1"/>
+          <p:nvPr/>
+        </p:nvSpPr>
+        <p:spPr>
+          <a:xfrm>
+            <a:off x="922789" y="1075496"/>
+            <a:ext cx="4723002" cy="369332"/>
+          </a:xfrm>
+          <a:prstGeom prst="rect">
+            <a:avLst/>
+          </a:prstGeom>
+          <a:noFill/>
+        </p:spPr>
+        <p:txBody>
+          <a:bodyPr wrap="square" rtlCol="0">
+            <a:spAutoFit/>
+          </a:bodyPr>
+          <a:lstStyle/>
+          <a:p>
+            <a:pPr algn="ctr"/>
+            <a:r>
+              <a:rPr lang="en-US" dirty="0"/>
+              <a:t>Sentiment Analysis</a:t>
+            </a:r>
+            <a:endParaRPr lang="en-GH" dirty="0"/>
+          </a:p>
+        </p:txBody>
+      </p:sp>
+      <p:sp>
+        <p:nvSpPr>
+          <p:cNvPr id="25" name="TextBox 24">
+            <a:extLst>
+              <a:ext uri="{FF2B5EF4-FFF2-40B4-BE49-F238E27FC236}">
+                <a16:creationId xmlns:a16="http://schemas.microsoft.com/office/drawing/2014/main" id="{E0E3FA7D-C225-69D3-E949-0D3710D22ECE}"/>
+              </a:ext>
+            </a:extLst>
+          </p:cNvPr>
+          <p:cNvSpPr txBox="1"/>
+          <p:nvPr/>
+        </p:nvSpPr>
+        <p:spPr>
+          <a:xfrm>
+            <a:off x="1539375" y="1676646"/>
+            <a:ext cx="1145220" cy="369332"/>
+          </a:xfrm>
+          <a:prstGeom prst="rect">
+            <a:avLst/>
+          </a:prstGeom>
+          <a:noFill/>
+        </p:spPr>
+        <p:txBody>
+          <a:bodyPr wrap="square" rtlCol="0">
+            <a:spAutoFit/>
+          </a:bodyPr>
+          <a:lstStyle/>
+          <a:p>
+            <a:r>
+              <a:rPr lang="en-US" dirty="0"/>
+              <a:t>71.7%</a:t>
+            </a:r>
+            <a:endParaRPr lang="en-GH" dirty="0"/>
+          </a:p>
+        </p:txBody>
+      </p:sp>
+      <p:sp>
+        <p:nvSpPr>
+          <p:cNvPr id="26" name="TextBox 25">
+            <a:extLst>
+              <a:ext uri="{FF2B5EF4-FFF2-40B4-BE49-F238E27FC236}">
+                <a16:creationId xmlns:a16="http://schemas.microsoft.com/office/drawing/2014/main" id="{A435E920-15B8-D99F-5135-919DD96918B2}"/>
+              </a:ext>
+            </a:extLst>
+          </p:cNvPr>
+          <p:cNvSpPr txBox="1"/>
+          <p:nvPr/>
+        </p:nvSpPr>
+        <p:spPr>
+          <a:xfrm>
+            <a:off x="4711663" y="2647128"/>
+            <a:ext cx="815754" cy="369332"/>
+          </a:xfrm>
+          <a:prstGeom prst="rect">
+            <a:avLst/>
+          </a:prstGeom>
+          <a:noFill/>
+        </p:spPr>
+        <p:txBody>
+          <a:bodyPr wrap="square" rtlCol="0">
+            <a:spAutoFit/>
+          </a:bodyPr>
+          <a:lstStyle/>
+          <a:p>
+            <a:r>
+              <a:rPr lang="en-US" dirty="0"/>
+              <a:t>0.5%</a:t>
+            </a:r>
+            <a:endParaRPr lang="en-GH" dirty="0"/>
+          </a:p>
+        </p:txBody>
+      </p:sp>
+      <p:sp>
+        <p:nvSpPr>
+          <p:cNvPr id="27" name="TextBox 26">
+            <a:extLst>
+              <a:ext uri="{FF2B5EF4-FFF2-40B4-BE49-F238E27FC236}">
+                <a16:creationId xmlns:a16="http://schemas.microsoft.com/office/drawing/2014/main" id="{202D9CD6-6C7E-0F8B-B26E-25AE334B42C1}"/>
+              </a:ext>
+            </a:extLst>
+          </p:cNvPr>
+          <p:cNvSpPr txBox="1"/>
+          <p:nvPr/>
+        </p:nvSpPr>
+        <p:spPr>
+          <a:xfrm>
+            <a:off x="3812750" y="3867133"/>
+            <a:ext cx="994299" cy="369332"/>
+          </a:xfrm>
+          <a:prstGeom prst="rect">
+            <a:avLst/>
+          </a:prstGeom>
+          <a:noFill/>
+        </p:spPr>
+        <p:txBody>
+          <a:bodyPr wrap="square" rtlCol="0">
+            <a:spAutoFit/>
+          </a:bodyPr>
+          <a:lstStyle/>
+          <a:p>
+            <a:r>
+              <a:rPr lang="en-US" dirty="0"/>
+              <a:t>27.8%</a:t>
+            </a:r>
+            <a:endParaRPr lang="en-GH" dirty="0"/>
           </a:p>
         </p:txBody>
       </p:sp>

</xml_diff>